<commit_message>
Demo2: Updated design diagrams
</commit_message>
<xml_diff>
--- a/design/electricalDiagram.pptx
+++ b/design/electricalDiagram.pptx
@@ -238,7 +238,7 @@
           <a:p>
             <a:fld id="{5A852F11-8B9F-4E3A-84B2-D575512D38C3}" type="datetimeFigureOut">
               <a:rPr lang="en-US" smtClean="0"/>
-              <a:t>2/18/2016</a:t>
+              <a:t>3/31/2016</a:t>
             </a:fld>
             <a:endParaRPr lang="en-US"/>
           </a:p>
@@ -408,7 +408,7 @@
           <a:p>
             <a:fld id="{5A852F11-8B9F-4E3A-84B2-D575512D38C3}" type="datetimeFigureOut">
               <a:rPr lang="en-US" smtClean="0"/>
-              <a:t>2/18/2016</a:t>
+              <a:t>3/31/2016</a:t>
             </a:fld>
             <a:endParaRPr lang="en-US"/>
           </a:p>
@@ -588,7 +588,7 @@
           <a:p>
             <a:fld id="{5A852F11-8B9F-4E3A-84B2-D575512D38C3}" type="datetimeFigureOut">
               <a:rPr lang="en-US" smtClean="0"/>
-              <a:t>2/18/2016</a:t>
+              <a:t>3/31/2016</a:t>
             </a:fld>
             <a:endParaRPr lang="en-US"/>
           </a:p>
@@ -758,7 +758,7 @@
           <a:p>
             <a:fld id="{5A852F11-8B9F-4E3A-84B2-D575512D38C3}" type="datetimeFigureOut">
               <a:rPr lang="en-US" smtClean="0"/>
-              <a:t>2/18/2016</a:t>
+              <a:t>3/31/2016</a:t>
             </a:fld>
             <a:endParaRPr lang="en-US"/>
           </a:p>
@@ -1004,7 +1004,7 @@
           <a:p>
             <a:fld id="{5A852F11-8B9F-4E3A-84B2-D575512D38C3}" type="datetimeFigureOut">
               <a:rPr lang="en-US" smtClean="0"/>
-              <a:t>2/18/2016</a:t>
+              <a:t>3/31/2016</a:t>
             </a:fld>
             <a:endParaRPr lang="en-US"/>
           </a:p>
@@ -1236,7 +1236,7 @@
           <a:p>
             <a:fld id="{5A852F11-8B9F-4E3A-84B2-D575512D38C3}" type="datetimeFigureOut">
               <a:rPr lang="en-US" smtClean="0"/>
-              <a:t>2/18/2016</a:t>
+              <a:t>3/31/2016</a:t>
             </a:fld>
             <a:endParaRPr lang="en-US"/>
           </a:p>
@@ -1603,7 +1603,7 @@
           <a:p>
             <a:fld id="{5A852F11-8B9F-4E3A-84B2-D575512D38C3}" type="datetimeFigureOut">
               <a:rPr lang="en-US" smtClean="0"/>
-              <a:t>2/18/2016</a:t>
+              <a:t>3/31/2016</a:t>
             </a:fld>
             <a:endParaRPr lang="en-US"/>
           </a:p>
@@ -1721,7 +1721,7 @@
           <a:p>
             <a:fld id="{5A852F11-8B9F-4E3A-84B2-D575512D38C3}" type="datetimeFigureOut">
               <a:rPr lang="en-US" smtClean="0"/>
-              <a:t>2/18/2016</a:t>
+              <a:t>3/31/2016</a:t>
             </a:fld>
             <a:endParaRPr lang="en-US"/>
           </a:p>
@@ -1816,7 +1816,7 @@
           <a:p>
             <a:fld id="{5A852F11-8B9F-4E3A-84B2-D575512D38C3}" type="datetimeFigureOut">
               <a:rPr lang="en-US" smtClean="0"/>
-              <a:t>2/18/2016</a:t>
+              <a:t>3/31/2016</a:t>
             </a:fld>
             <a:endParaRPr lang="en-US"/>
           </a:p>
@@ -2093,7 +2093,7 @@
           <a:p>
             <a:fld id="{5A852F11-8B9F-4E3A-84B2-D575512D38C3}" type="datetimeFigureOut">
               <a:rPr lang="en-US" smtClean="0"/>
-              <a:t>2/18/2016</a:t>
+              <a:t>3/31/2016</a:t>
             </a:fld>
             <a:endParaRPr lang="en-US"/>
           </a:p>
@@ -2346,7 +2346,7 @@
           <a:p>
             <a:fld id="{5A852F11-8B9F-4E3A-84B2-D575512D38C3}" type="datetimeFigureOut">
               <a:rPr lang="en-US" smtClean="0"/>
-              <a:t>2/18/2016</a:t>
+              <a:t>3/31/2016</a:t>
             </a:fld>
             <a:endParaRPr lang="en-US"/>
           </a:p>
@@ -2559,7 +2559,7 @@
           <a:p>
             <a:fld id="{5A852F11-8B9F-4E3A-84B2-D575512D38C3}" type="datetimeFigureOut">
               <a:rPr lang="en-US" smtClean="0"/>
-              <a:t>2/18/2016</a:t>
+              <a:t>3/31/2016</a:t>
             </a:fld>
             <a:endParaRPr lang="en-US"/>
           </a:p>
@@ -2972,7 +2972,7 @@
         </p:nvSpPr>
         <p:spPr>
           <a:xfrm>
-            <a:off x="8019340" y="2031998"/>
+            <a:off x="8019340" y="1670476"/>
             <a:ext cx="1834445" cy="2630311"/>
           </a:xfrm>
           <a:prstGeom prst="rect">
@@ -3019,7 +3019,7 @@
         </p:nvSpPr>
         <p:spPr>
           <a:xfrm>
-            <a:off x="8332606" y="2801089"/>
+            <a:off x="8332606" y="2439567"/>
             <a:ext cx="1207911" cy="646331"/>
           </a:xfrm>
           <a:prstGeom prst="rect">
@@ -3055,7 +3055,7 @@
         </p:nvSpPr>
         <p:spPr>
           <a:xfrm>
-            <a:off x="8029920" y="3646646"/>
+            <a:off x="8029920" y="3285124"/>
             <a:ext cx="629356" cy="1015663"/>
           </a:xfrm>
           <a:prstGeom prst="rect">
@@ -3110,7 +3110,7 @@
         </p:nvSpPr>
         <p:spPr>
           <a:xfrm>
-            <a:off x="8492062" y="2043285"/>
+            <a:off x="8492062" y="1681763"/>
             <a:ext cx="888997" cy="461665"/>
           </a:xfrm>
           <a:prstGeom prst="rect">
@@ -3367,7 +3367,7 @@
             <a:pPr algn="ctr"/>
             <a:r>
               <a:rPr lang="en-US" dirty="0" smtClean="0"/>
-              <a:t>Servo:L</a:t>
+              <a:t>Servo</a:t>
             </a:r>
             <a:endParaRPr lang="en-US" dirty="0"/>
           </a:p>
@@ -3412,7 +3412,7 @@
             <a:pPr algn="ctr"/>
             <a:r>
               <a:rPr lang="en-US" dirty="0" smtClean="0"/>
-              <a:t>Servo:R</a:t>
+              <a:t>Servo</a:t>
             </a:r>
             <a:endParaRPr lang="en-US" dirty="0"/>
           </a:p>
@@ -3469,7 +3469,7 @@
         </p:nvCxnSpPr>
         <p:spPr>
           <a:xfrm>
-            <a:off x="10374489" y="1354667"/>
+            <a:off x="10374489" y="1344034"/>
             <a:ext cx="869245" cy="0"/>
           </a:xfrm>
           <a:prstGeom prst="line">
@@ -3574,7 +3574,7 @@
         </p:nvCxnSpPr>
         <p:spPr>
           <a:xfrm>
-            <a:off x="10543822" y="1467908"/>
+            <a:off x="10543822" y="1457275"/>
             <a:ext cx="541867" cy="0"/>
           </a:xfrm>
           <a:prstGeom prst="line">
@@ -3743,49 +3743,14 @@
       </p:cxnSp>
       <p:cxnSp>
         <p:nvCxnSpPr>
-          <p:cNvPr id="44" name="Straight Connector 43"/>
-          <p:cNvCxnSpPr/>
-          <p:nvPr/>
-        </p:nvCxnSpPr>
-        <p:spPr>
-          <a:xfrm>
-            <a:off x="8954898" y="1376097"/>
-            <a:ext cx="0" cy="644610"/>
-          </a:xfrm>
-          <a:prstGeom prst="line">
-            <a:avLst/>
-          </a:prstGeom>
-          <a:ln w="28575">
-            <a:solidFill>
-              <a:schemeClr val="tx1"/>
-            </a:solidFill>
-          </a:ln>
-        </p:spPr>
-        <p:style>
-          <a:lnRef idx="1">
-            <a:schemeClr val="accent1"/>
-          </a:lnRef>
-          <a:fillRef idx="0">
-            <a:schemeClr val="accent1"/>
-          </a:fillRef>
-          <a:effectRef idx="0">
-            <a:schemeClr val="accent1"/>
-          </a:effectRef>
-          <a:fontRef idx="minor">
-            <a:schemeClr val="tx1"/>
-          </a:fontRef>
-        </p:style>
-      </p:cxnSp>
-      <p:cxnSp>
-        <p:nvCxnSpPr>
           <p:cNvPr id="47" name="Straight Connector 46"/>
           <p:cNvCxnSpPr/>
           <p:nvPr/>
         </p:nvCxnSpPr>
         <p:spPr>
           <a:xfrm flipV="1">
-            <a:off x="10809111" y="739423"/>
-            <a:ext cx="0" cy="593237"/>
+            <a:off x="10809111" y="724275"/>
+            <a:ext cx="2821" cy="597754"/>
           </a:xfrm>
           <a:prstGeom prst="line">
             <a:avLst/>
@@ -3819,8 +3784,8 @@
         </p:nvCxnSpPr>
         <p:spPr>
           <a:xfrm flipH="1">
-            <a:off x="8954898" y="739423"/>
-            <a:ext cx="1854213" cy="0"/>
+            <a:off x="8936560" y="734908"/>
+            <a:ext cx="1878195" cy="1"/>
           </a:xfrm>
           <a:prstGeom prst="line">
             <a:avLst/>
@@ -3849,13 +3814,15 @@
       <p:cxnSp>
         <p:nvCxnSpPr>
           <p:cNvPr id="55" name="Straight Connector 54"/>
-          <p:cNvCxnSpPr/>
+          <p:cNvCxnSpPr>
+            <a:endCxn id="4" idx="0"/>
+          </p:cNvCxnSpPr>
           <p:nvPr/>
         </p:nvCxnSpPr>
         <p:spPr>
-          <a:xfrm flipH="1">
-            <a:off x="8954897" y="739423"/>
-            <a:ext cx="1" cy="636674"/>
+          <a:xfrm>
+            <a:off x="8936560" y="734908"/>
+            <a:ext cx="3" cy="935568"/>
           </a:xfrm>
           <a:prstGeom prst="line">
             <a:avLst/>
@@ -3889,7 +3856,7 @@
         </p:nvCxnSpPr>
         <p:spPr>
           <a:xfrm flipH="1">
-            <a:off x="10809111" y="1467908"/>
+            <a:off x="10809111" y="1457275"/>
             <a:ext cx="5643" cy="1037042"/>
           </a:xfrm>
           <a:prstGeom prst="line">
@@ -3924,7 +3891,7 @@
         </p:nvCxnSpPr>
         <p:spPr>
           <a:xfrm>
-            <a:off x="10588269" y="2504950"/>
+            <a:off x="10588269" y="2494317"/>
             <a:ext cx="440270" cy="0"/>
           </a:xfrm>
           <a:prstGeom prst="line">
@@ -3959,7 +3926,7 @@
         </p:nvCxnSpPr>
         <p:spPr>
           <a:xfrm>
-            <a:off x="10699038" y="2576681"/>
+            <a:off x="10699038" y="2566048"/>
             <a:ext cx="231433" cy="0"/>
           </a:xfrm>
           <a:prstGeom prst="line">
@@ -3994,7 +3961,7 @@
         </p:nvCxnSpPr>
         <p:spPr>
           <a:xfrm>
-            <a:off x="10746307" y="2658214"/>
+            <a:off x="10746307" y="2647581"/>
             <a:ext cx="127014" cy="0"/>
           </a:xfrm>
           <a:prstGeom prst="line">
@@ -4827,7 +4794,7 @@
         <p:spPr>
           <a:xfrm>
             <a:off x="5343118" y="3037414"/>
-            <a:ext cx="2656115" cy="719910"/>
+            <a:ext cx="2656115" cy="359955"/>
           </a:xfrm>
           <a:prstGeom prst="bentConnector3">
             <a:avLst/>
@@ -4893,7 +4860,7 @@
         </p:nvCxnSpPr>
         <p:spPr>
           <a:xfrm>
-            <a:off x="6680214" y="3976578"/>
+            <a:off x="6680214" y="3609138"/>
             <a:ext cx="1322010" cy="0"/>
           </a:xfrm>
           <a:prstGeom prst="straightConnector1">
@@ -4929,7 +4896,7 @@
         </p:nvCxnSpPr>
         <p:spPr>
           <a:xfrm>
-            <a:off x="6680214" y="4158022"/>
+            <a:off x="6681808" y="3799353"/>
             <a:ext cx="1322010" cy="0"/>
           </a:xfrm>
           <a:prstGeom prst="straightConnector1">
@@ -4965,7 +4932,7 @@
         </p:nvSpPr>
         <p:spPr>
           <a:xfrm>
-            <a:off x="11243734" y="1191431"/>
+            <a:off x="9662011" y="1159368"/>
             <a:ext cx="712478" cy="369332"/>
           </a:xfrm>
           <a:prstGeom prst="rect">
@@ -4996,7 +4963,7 @@
         </p:nvSpPr>
         <p:spPr>
           <a:xfrm>
-            <a:off x="5666310" y="3801083"/>
+            <a:off x="5666310" y="3428928"/>
             <a:ext cx="1100196" cy="307777"/>
           </a:xfrm>
           <a:prstGeom prst="rect">
@@ -5027,7 +4994,7 @@
         </p:nvSpPr>
         <p:spPr>
           <a:xfrm>
-            <a:off x="5819307" y="3998185"/>
+            <a:off x="5819307" y="3626030"/>
             <a:ext cx="1100196" cy="307777"/>
           </a:xfrm>
           <a:prstGeom prst="rect">
@@ -5494,38 +5461,6 @@
       </p:sp>
       <p:cxnSp>
         <p:nvCxnSpPr>
-          <p:cNvPr id="165" name="Straight Connector 164"/>
-          <p:cNvCxnSpPr>
-            <a:stCxn id="10" idx="0"/>
-          </p:cNvCxnSpPr>
-          <p:nvPr/>
-        </p:nvCxnSpPr>
-        <p:spPr>
-          <a:xfrm>
-            <a:off x="3294164" y="2274117"/>
-            <a:ext cx="914400" cy="914400"/>
-          </a:xfrm>
-          <a:prstGeom prst="line">
-            <a:avLst/>
-          </a:prstGeom>
-        </p:spPr>
-        <p:style>
-          <a:lnRef idx="1">
-            <a:schemeClr val="accent1"/>
-          </a:lnRef>
-          <a:fillRef idx="0">
-            <a:schemeClr val="accent1"/>
-          </a:fillRef>
-          <a:effectRef idx="0">
-            <a:schemeClr val="accent1"/>
-          </a:effectRef>
-          <a:fontRef idx="minor">
-            <a:schemeClr val="tx1"/>
-          </a:fontRef>
-        </p:style>
-      </p:cxnSp>
-      <p:cxnSp>
-        <p:nvCxnSpPr>
           <p:cNvPr id="170" name="Straight Connector 169"/>
           <p:cNvCxnSpPr/>
           <p:nvPr/>
@@ -5755,6 +5690,809 @@
               <a:t>Ground</a:t>
             </a:r>
             <a:endParaRPr lang="en-US" sz="1400" dirty="0"/>
+          </a:p>
+        </p:txBody>
+      </p:sp>
+      <p:sp>
+        <p:nvSpPr>
+          <p:cNvPr id="79" name="TextBox 78"/>
+          <p:cNvSpPr txBox="1"/>
+          <p:nvPr/>
+        </p:nvSpPr>
+        <p:spPr>
+          <a:xfrm>
+            <a:off x="8432346" y="4610297"/>
+            <a:ext cx="931333" cy="640687"/>
+          </a:xfrm>
+          <a:prstGeom prst="rect">
+            <a:avLst/>
+          </a:prstGeom>
+          <a:solidFill>
+            <a:schemeClr val="accent6"/>
+          </a:solidFill>
+          <a:ln w="38100">
+            <a:solidFill>
+              <a:schemeClr val="tx1"/>
+            </a:solidFill>
+          </a:ln>
+        </p:spPr>
+        <p:txBody>
+          <a:bodyPr wrap="square" rtlCol="0">
+            <a:spAutoFit/>
+          </a:bodyPr>
+          <a:lstStyle/>
+          <a:p>
+            <a:pPr algn="ctr"/>
+            <a:r>
+              <a:rPr lang="en-US" dirty="0" smtClean="0"/>
+              <a:t>XL-320</a:t>
+            </a:r>
+          </a:p>
+          <a:p>
+            <a:pPr algn="ctr"/>
+            <a:r>
+              <a:rPr lang="en-US" dirty="0" smtClean="0"/>
+              <a:t>Servo</a:t>
+            </a:r>
+            <a:endParaRPr lang="en-US" dirty="0"/>
+          </a:p>
+        </p:txBody>
+      </p:sp>
+      <p:sp>
+        <p:nvSpPr>
+          <p:cNvPr id="80" name="TextBox 79"/>
+          <p:cNvSpPr txBox="1"/>
+          <p:nvPr/>
+        </p:nvSpPr>
+        <p:spPr>
+          <a:xfrm>
+            <a:off x="5306341" y="4589576"/>
+            <a:ext cx="931333" cy="640687"/>
+          </a:xfrm>
+          <a:prstGeom prst="rect">
+            <a:avLst/>
+          </a:prstGeom>
+          <a:solidFill>
+            <a:schemeClr val="accent6"/>
+          </a:solidFill>
+          <a:ln w="38100">
+            <a:solidFill>
+              <a:schemeClr val="tx1"/>
+            </a:solidFill>
+          </a:ln>
+        </p:spPr>
+        <p:txBody>
+          <a:bodyPr wrap="square" rtlCol="0">
+            <a:spAutoFit/>
+          </a:bodyPr>
+          <a:lstStyle/>
+          <a:p>
+            <a:pPr algn="ctr"/>
+            <a:r>
+              <a:rPr lang="en-US" dirty="0" smtClean="0"/>
+              <a:t>XL-320</a:t>
+            </a:r>
+          </a:p>
+          <a:p>
+            <a:pPr algn="ctr"/>
+            <a:r>
+              <a:rPr lang="en-US" dirty="0" smtClean="0"/>
+              <a:t>Servo</a:t>
+            </a:r>
+            <a:endParaRPr lang="en-US" dirty="0"/>
+          </a:p>
+        </p:txBody>
+      </p:sp>
+      <p:sp>
+        <p:nvSpPr>
+          <p:cNvPr id="81" name="TextBox 80"/>
+          <p:cNvSpPr txBox="1"/>
+          <p:nvPr/>
+        </p:nvSpPr>
+        <p:spPr>
+          <a:xfrm>
+            <a:off x="6869305" y="4600584"/>
+            <a:ext cx="931333" cy="640687"/>
+          </a:xfrm>
+          <a:prstGeom prst="rect">
+            <a:avLst/>
+          </a:prstGeom>
+          <a:solidFill>
+            <a:schemeClr val="accent6"/>
+          </a:solidFill>
+          <a:ln w="38100">
+            <a:solidFill>
+              <a:schemeClr val="tx1"/>
+            </a:solidFill>
+          </a:ln>
+        </p:spPr>
+        <p:txBody>
+          <a:bodyPr wrap="square" rtlCol="0">
+            <a:spAutoFit/>
+          </a:bodyPr>
+          <a:lstStyle/>
+          <a:p>
+            <a:pPr algn="ctr"/>
+            <a:r>
+              <a:rPr lang="en-US" dirty="0" smtClean="0"/>
+              <a:t>XL-320</a:t>
+            </a:r>
+          </a:p>
+          <a:p>
+            <a:pPr algn="ctr"/>
+            <a:r>
+              <a:rPr lang="en-US" dirty="0" smtClean="0"/>
+              <a:t>Servo</a:t>
+            </a:r>
+            <a:endParaRPr lang="en-US" dirty="0"/>
+          </a:p>
+        </p:txBody>
+      </p:sp>
+      <p:cxnSp>
+        <p:nvCxnSpPr>
+          <p:cNvPr id="93" name="Straight Arrow Connector 92"/>
+          <p:cNvCxnSpPr/>
+          <p:nvPr/>
+        </p:nvCxnSpPr>
+        <p:spPr>
+          <a:xfrm>
+            <a:off x="4674633" y="4720856"/>
+            <a:ext cx="610442" cy="0"/>
+          </a:xfrm>
+          <a:prstGeom prst="straightConnector1">
+            <a:avLst/>
+          </a:prstGeom>
+          <a:ln>
+            <a:solidFill>
+              <a:srgbClr val="FF0000"/>
+            </a:solidFill>
+            <a:tailEnd type="triangle"/>
+          </a:ln>
+        </p:spPr>
+        <p:style>
+          <a:lnRef idx="1">
+            <a:schemeClr val="accent1"/>
+          </a:lnRef>
+          <a:fillRef idx="0">
+            <a:schemeClr val="accent1"/>
+          </a:fillRef>
+          <a:effectRef idx="0">
+            <a:schemeClr val="accent1"/>
+          </a:effectRef>
+          <a:fontRef idx="minor">
+            <a:schemeClr val="tx1"/>
+          </a:fontRef>
+        </p:style>
+      </p:cxnSp>
+      <p:cxnSp>
+        <p:nvCxnSpPr>
+          <p:cNvPr id="94" name="Straight Arrow Connector 93"/>
+          <p:cNvCxnSpPr/>
+          <p:nvPr/>
+        </p:nvCxnSpPr>
+        <p:spPr>
+          <a:xfrm>
+            <a:off x="6237674" y="4720856"/>
+            <a:ext cx="610442" cy="0"/>
+          </a:xfrm>
+          <a:prstGeom prst="straightConnector1">
+            <a:avLst/>
+          </a:prstGeom>
+          <a:ln>
+            <a:solidFill>
+              <a:srgbClr val="FF0000"/>
+            </a:solidFill>
+            <a:tailEnd type="triangle"/>
+          </a:ln>
+        </p:spPr>
+        <p:style>
+          <a:lnRef idx="1">
+            <a:schemeClr val="accent1"/>
+          </a:lnRef>
+          <a:fillRef idx="0">
+            <a:schemeClr val="accent1"/>
+          </a:fillRef>
+          <a:effectRef idx="0">
+            <a:schemeClr val="accent1"/>
+          </a:effectRef>
+          <a:fontRef idx="minor">
+            <a:schemeClr val="tx1"/>
+          </a:fontRef>
+        </p:style>
+      </p:cxnSp>
+      <p:cxnSp>
+        <p:nvCxnSpPr>
+          <p:cNvPr id="95" name="Straight Arrow Connector 94"/>
+          <p:cNvCxnSpPr/>
+          <p:nvPr/>
+        </p:nvCxnSpPr>
+        <p:spPr>
+          <a:xfrm>
+            <a:off x="7800638" y="4720856"/>
+            <a:ext cx="610442" cy="0"/>
+          </a:xfrm>
+          <a:prstGeom prst="straightConnector1">
+            <a:avLst/>
+          </a:prstGeom>
+          <a:ln>
+            <a:solidFill>
+              <a:srgbClr val="FF0000"/>
+            </a:solidFill>
+            <a:tailEnd type="triangle"/>
+          </a:ln>
+        </p:spPr>
+        <p:style>
+          <a:lnRef idx="1">
+            <a:schemeClr val="accent1"/>
+          </a:lnRef>
+          <a:fillRef idx="0">
+            <a:schemeClr val="accent1"/>
+          </a:fillRef>
+          <a:effectRef idx="0">
+            <a:schemeClr val="accent1"/>
+          </a:effectRef>
+          <a:fontRef idx="minor">
+            <a:schemeClr val="tx1"/>
+          </a:fontRef>
+        </p:style>
+      </p:cxnSp>
+      <p:sp>
+        <p:nvSpPr>
+          <p:cNvPr id="107" name="TextBox 106"/>
+          <p:cNvSpPr txBox="1"/>
+          <p:nvPr/>
+        </p:nvSpPr>
+        <p:spPr>
+          <a:xfrm flipH="1">
+            <a:off x="4697914" y="4430783"/>
+            <a:ext cx="846605" cy="307777"/>
+          </a:xfrm>
+          <a:prstGeom prst="rect">
+            <a:avLst/>
+          </a:prstGeom>
+          <a:noFill/>
+        </p:spPr>
+        <p:txBody>
+          <a:bodyPr wrap="square" rtlCol="0">
+            <a:spAutoFit/>
+          </a:bodyPr>
+          <a:lstStyle/>
+          <a:p>
+            <a:r>
+              <a:rPr lang="en-US" sz="1400" dirty="0" smtClean="0">
+                <a:solidFill>
+                  <a:srgbClr val="FF0000"/>
+                </a:solidFill>
+              </a:rPr>
+              <a:t>Vin</a:t>
+            </a:r>
+            <a:endParaRPr lang="en-US" sz="1400" dirty="0">
+              <a:solidFill>
+                <a:srgbClr val="FF0000"/>
+              </a:solidFill>
+            </a:endParaRPr>
+          </a:p>
+        </p:txBody>
+      </p:sp>
+      <p:sp>
+        <p:nvSpPr>
+          <p:cNvPr id="108" name="TextBox 107"/>
+          <p:cNvSpPr txBox="1"/>
+          <p:nvPr/>
+        </p:nvSpPr>
+        <p:spPr>
+          <a:xfrm flipH="1">
+            <a:off x="6237674" y="4445530"/>
+            <a:ext cx="846605" cy="307777"/>
+          </a:xfrm>
+          <a:prstGeom prst="rect">
+            <a:avLst/>
+          </a:prstGeom>
+          <a:noFill/>
+        </p:spPr>
+        <p:txBody>
+          <a:bodyPr wrap="square" rtlCol="0">
+            <a:spAutoFit/>
+          </a:bodyPr>
+          <a:lstStyle/>
+          <a:p>
+            <a:r>
+              <a:rPr lang="en-US" sz="1400" dirty="0" smtClean="0">
+                <a:solidFill>
+                  <a:srgbClr val="FF0000"/>
+                </a:solidFill>
+              </a:rPr>
+              <a:t>Vin</a:t>
+            </a:r>
+            <a:endParaRPr lang="en-US" sz="1400" dirty="0">
+              <a:solidFill>
+                <a:srgbClr val="FF0000"/>
+              </a:solidFill>
+            </a:endParaRPr>
+          </a:p>
+        </p:txBody>
+      </p:sp>
+      <p:sp>
+        <p:nvSpPr>
+          <p:cNvPr id="110" name="TextBox 109"/>
+          <p:cNvSpPr txBox="1"/>
+          <p:nvPr/>
+        </p:nvSpPr>
+        <p:spPr>
+          <a:xfrm flipH="1">
+            <a:off x="7800638" y="4445529"/>
+            <a:ext cx="846605" cy="307777"/>
+          </a:xfrm>
+          <a:prstGeom prst="rect">
+            <a:avLst/>
+          </a:prstGeom>
+          <a:noFill/>
+        </p:spPr>
+        <p:txBody>
+          <a:bodyPr wrap="square" rtlCol="0">
+            <a:spAutoFit/>
+          </a:bodyPr>
+          <a:lstStyle/>
+          <a:p>
+            <a:r>
+              <a:rPr lang="en-US" sz="1400" dirty="0" smtClean="0">
+                <a:solidFill>
+                  <a:srgbClr val="FF0000"/>
+                </a:solidFill>
+              </a:rPr>
+              <a:t>Vin</a:t>
+            </a:r>
+            <a:endParaRPr lang="en-US" sz="1400" dirty="0">
+              <a:solidFill>
+                <a:srgbClr val="FF0000"/>
+              </a:solidFill>
+            </a:endParaRPr>
+          </a:p>
+        </p:txBody>
+      </p:sp>
+      <p:cxnSp>
+        <p:nvCxnSpPr>
+          <p:cNvPr id="113" name="Straight Arrow Connector 112"/>
+          <p:cNvCxnSpPr>
+            <a:stCxn id="14" idx="3"/>
+            <a:endCxn id="80" idx="1"/>
+          </p:cNvCxnSpPr>
+          <p:nvPr/>
+        </p:nvCxnSpPr>
+        <p:spPr>
+          <a:xfrm>
+            <a:off x="4653842" y="4909837"/>
+            <a:ext cx="652499" cy="83"/>
+          </a:xfrm>
+          <a:prstGeom prst="straightConnector1">
+            <a:avLst/>
+          </a:prstGeom>
+          <a:ln>
+            <a:solidFill>
+              <a:schemeClr val="tx1"/>
+            </a:solidFill>
+            <a:tailEnd type="triangle"/>
+          </a:ln>
+        </p:spPr>
+        <p:style>
+          <a:lnRef idx="1">
+            <a:schemeClr val="accent1"/>
+          </a:lnRef>
+          <a:fillRef idx="0">
+            <a:schemeClr val="accent1"/>
+          </a:fillRef>
+          <a:effectRef idx="0">
+            <a:schemeClr val="accent1"/>
+          </a:effectRef>
+          <a:fontRef idx="minor">
+            <a:schemeClr val="tx1"/>
+          </a:fontRef>
+        </p:style>
+      </p:cxnSp>
+      <p:cxnSp>
+        <p:nvCxnSpPr>
+          <p:cNvPr id="115" name="Straight Arrow Connector 114"/>
+          <p:cNvCxnSpPr>
+            <a:stCxn id="80" idx="3"/>
+          </p:cNvCxnSpPr>
+          <p:nvPr/>
+        </p:nvCxnSpPr>
+        <p:spPr>
+          <a:xfrm flipV="1">
+            <a:off x="6237674" y="4909836"/>
+            <a:ext cx="610442" cy="84"/>
+          </a:xfrm>
+          <a:prstGeom prst="straightConnector1">
+            <a:avLst/>
+          </a:prstGeom>
+          <a:ln>
+            <a:solidFill>
+              <a:schemeClr val="tx1"/>
+            </a:solidFill>
+            <a:tailEnd type="triangle"/>
+          </a:ln>
+        </p:spPr>
+        <p:style>
+          <a:lnRef idx="1">
+            <a:schemeClr val="accent1"/>
+          </a:lnRef>
+          <a:fillRef idx="0">
+            <a:schemeClr val="accent1"/>
+          </a:fillRef>
+          <a:effectRef idx="0">
+            <a:schemeClr val="accent1"/>
+          </a:effectRef>
+          <a:fontRef idx="minor">
+            <a:schemeClr val="tx1"/>
+          </a:fontRef>
+        </p:style>
+      </p:cxnSp>
+      <p:cxnSp>
+        <p:nvCxnSpPr>
+          <p:cNvPr id="116" name="Straight Arrow Connector 115"/>
+          <p:cNvCxnSpPr/>
+          <p:nvPr/>
+        </p:nvCxnSpPr>
+        <p:spPr>
+          <a:xfrm flipV="1">
+            <a:off x="7821904" y="4922584"/>
+            <a:ext cx="610442" cy="84"/>
+          </a:xfrm>
+          <a:prstGeom prst="straightConnector1">
+            <a:avLst/>
+          </a:prstGeom>
+          <a:ln>
+            <a:solidFill>
+              <a:schemeClr val="tx1"/>
+            </a:solidFill>
+            <a:tailEnd type="triangle"/>
+          </a:ln>
+        </p:spPr>
+        <p:style>
+          <a:lnRef idx="1">
+            <a:schemeClr val="accent1"/>
+          </a:lnRef>
+          <a:fillRef idx="0">
+            <a:schemeClr val="accent1"/>
+          </a:fillRef>
+          <a:effectRef idx="0">
+            <a:schemeClr val="accent1"/>
+          </a:effectRef>
+          <a:fontRef idx="minor">
+            <a:schemeClr val="tx1"/>
+          </a:fontRef>
+        </p:style>
+      </p:cxnSp>
+      <p:sp>
+        <p:nvSpPr>
+          <p:cNvPr id="117" name="TextBox 116"/>
+          <p:cNvSpPr txBox="1"/>
+          <p:nvPr/>
+        </p:nvSpPr>
+        <p:spPr>
+          <a:xfrm flipH="1">
+            <a:off x="4597387" y="4667691"/>
+            <a:ext cx="846605" cy="307777"/>
+          </a:xfrm>
+          <a:prstGeom prst="rect">
+            <a:avLst/>
+          </a:prstGeom>
+          <a:noFill/>
+        </p:spPr>
+        <p:txBody>
+          <a:bodyPr wrap="square" rtlCol="0">
+            <a:spAutoFit/>
+          </a:bodyPr>
+          <a:lstStyle/>
+          <a:p>
+            <a:r>
+              <a:rPr lang="en-US" sz="1400" dirty="0" smtClean="0"/>
+              <a:t>Ground</a:t>
+            </a:r>
+            <a:endParaRPr lang="en-US" sz="1400" dirty="0"/>
+          </a:p>
+        </p:txBody>
+      </p:sp>
+      <p:sp>
+        <p:nvSpPr>
+          <p:cNvPr id="119" name="TextBox 118"/>
+          <p:cNvSpPr txBox="1"/>
+          <p:nvPr/>
+        </p:nvSpPr>
+        <p:spPr>
+          <a:xfrm flipH="1">
+            <a:off x="6162124" y="4660600"/>
+            <a:ext cx="846605" cy="307777"/>
+          </a:xfrm>
+          <a:prstGeom prst="rect">
+            <a:avLst/>
+          </a:prstGeom>
+          <a:noFill/>
+        </p:spPr>
+        <p:txBody>
+          <a:bodyPr wrap="square" rtlCol="0">
+            <a:spAutoFit/>
+          </a:bodyPr>
+          <a:lstStyle/>
+          <a:p>
+            <a:r>
+              <a:rPr lang="en-US" sz="1400" dirty="0" smtClean="0"/>
+              <a:t>Ground</a:t>
+            </a:r>
+            <a:endParaRPr lang="en-US" sz="1400" dirty="0"/>
+          </a:p>
+        </p:txBody>
+      </p:sp>
+      <p:sp>
+        <p:nvSpPr>
+          <p:cNvPr id="120" name="TextBox 119"/>
+          <p:cNvSpPr txBox="1"/>
+          <p:nvPr/>
+        </p:nvSpPr>
+        <p:spPr>
+          <a:xfrm flipH="1">
+            <a:off x="7746354" y="4667691"/>
+            <a:ext cx="846605" cy="307777"/>
+          </a:xfrm>
+          <a:prstGeom prst="rect">
+            <a:avLst/>
+          </a:prstGeom>
+          <a:noFill/>
+        </p:spPr>
+        <p:txBody>
+          <a:bodyPr wrap="square" rtlCol="0">
+            <a:spAutoFit/>
+          </a:bodyPr>
+          <a:lstStyle/>
+          <a:p>
+            <a:r>
+              <a:rPr lang="en-US" sz="1400" dirty="0" smtClean="0"/>
+              <a:t>Ground</a:t>
+            </a:r>
+            <a:endParaRPr lang="en-US" sz="1400" dirty="0"/>
+          </a:p>
+        </p:txBody>
+      </p:sp>
+      <p:sp>
+        <p:nvSpPr>
+          <p:cNvPr id="122" name="TextBox 121"/>
+          <p:cNvSpPr txBox="1"/>
+          <p:nvPr/>
+        </p:nvSpPr>
+        <p:spPr>
+          <a:xfrm flipH="1">
+            <a:off x="4649575" y="4922910"/>
+            <a:ext cx="846605" cy="307777"/>
+          </a:xfrm>
+          <a:prstGeom prst="rect">
+            <a:avLst/>
+          </a:prstGeom>
+          <a:noFill/>
+        </p:spPr>
+        <p:txBody>
+          <a:bodyPr wrap="square" rtlCol="0">
+            <a:spAutoFit/>
+          </a:bodyPr>
+          <a:lstStyle/>
+          <a:p>
+            <a:r>
+              <a:rPr lang="en-US" sz="1400" dirty="0" smtClean="0">
+                <a:solidFill>
+                  <a:schemeClr val="accent2">
+                    <a:lumMod val="75000"/>
+                  </a:schemeClr>
+                </a:solidFill>
+              </a:rPr>
+              <a:t>Serial</a:t>
+            </a:r>
+            <a:endParaRPr lang="en-US" sz="1400" dirty="0">
+              <a:solidFill>
+                <a:schemeClr val="accent2">
+                  <a:lumMod val="75000"/>
+                </a:schemeClr>
+              </a:solidFill>
+            </a:endParaRPr>
+          </a:p>
+        </p:txBody>
+      </p:sp>
+      <p:cxnSp>
+        <p:nvCxnSpPr>
+          <p:cNvPr id="124" name="Straight Arrow Connector 123"/>
+          <p:cNvCxnSpPr/>
+          <p:nvPr/>
+        </p:nvCxnSpPr>
+        <p:spPr>
+          <a:xfrm flipH="1">
+            <a:off x="4653842" y="5183269"/>
+            <a:ext cx="652499" cy="0"/>
+          </a:xfrm>
+          <a:prstGeom prst="straightConnector1">
+            <a:avLst/>
+          </a:prstGeom>
+          <a:ln>
+            <a:solidFill>
+              <a:schemeClr val="accent2">
+                <a:lumMod val="75000"/>
+              </a:schemeClr>
+            </a:solidFill>
+            <a:headEnd type="triangle"/>
+            <a:tailEnd type="triangle"/>
+          </a:ln>
+        </p:spPr>
+        <p:style>
+          <a:lnRef idx="1">
+            <a:schemeClr val="accent1"/>
+          </a:lnRef>
+          <a:fillRef idx="0">
+            <a:schemeClr val="accent1"/>
+          </a:fillRef>
+          <a:effectRef idx="0">
+            <a:schemeClr val="accent1"/>
+          </a:effectRef>
+          <a:fontRef idx="minor">
+            <a:schemeClr val="tx1"/>
+          </a:fontRef>
+        </p:style>
+      </p:cxnSp>
+      <p:cxnSp>
+        <p:nvCxnSpPr>
+          <p:cNvPr id="125" name="Straight Arrow Connector 124"/>
+          <p:cNvCxnSpPr/>
+          <p:nvPr/>
+        </p:nvCxnSpPr>
+        <p:spPr>
+          <a:xfrm flipH="1">
+            <a:off x="6216806" y="5183269"/>
+            <a:ext cx="652499" cy="0"/>
+          </a:xfrm>
+          <a:prstGeom prst="straightConnector1">
+            <a:avLst/>
+          </a:prstGeom>
+          <a:ln>
+            <a:solidFill>
+              <a:schemeClr val="accent2">
+                <a:lumMod val="75000"/>
+              </a:schemeClr>
+            </a:solidFill>
+            <a:headEnd type="triangle"/>
+            <a:tailEnd type="triangle"/>
+          </a:ln>
+        </p:spPr>
+        <p:style>
+          <a:lnRef idx="1">
+            <a:schemeClr val="accent1"/>
+          </a:lnRef>
+          <a:fillRef idx="0">
+            <a:schemeClr val="accent1"/>
+          </a:fillRef>
+          <a:effectRef idx="0">
+            <a:schemeClr val="accent1"/>
+          </a:effectRef>
+          <a:fontRef idx="minor">
+            <a:schemeClr val="tx1"/>
+          </a:fontRef>
+        </p:style>
+      </p:cxnSp>
+      <p:cxnSp>
+        <p:nvCxnSpPr>
+          <p:cNvPr id="127" name="Straight Arrow Connector 126"/>
+          <p:cNvCxnSpPr/>
+          <p:nvPr/>
+        </p:nvCxnSpPr>
+        <p:spPr>
+          <a:xfrm flipH="1">
+            <a:off x="7775064" y="5183269"/>
+            <a:ext cx="652499" cy="0"/>
+          </a:xfrm>
+          <a:prstGeom prst="straightConnector1">
+            <a:avLst/>
+          </a:prstGeom>
+          <a:ln>
+            <a:solidFill>
+              <a:schemeClr val="accent2">
+                <a:lumMod val="75000"/>
+              </a:schemeClr>
+            </a:solidFill>
+            <a:headEnd type="triangle"/>
+            <a:tailEnd type="triangle"/>
+          </a:ln>
+        </p:spPr>
+        <p:style>
+          <a:lnRef idx="1">
+            <a:schemeClr val="accent1"/>
+          </a:lnRef>
+          <a:fillRef idx="0">
+            <a:schemeClr val="accent1"/>
+          </a:fillRef>
+          <a:effectRef idx="0">
+            <a:schemeClr val="accent1"/>
+          </a:effectRef>
+          <a:fontRef idx="minor">
+            <a:schemeClr val="tx1"/>
+          </a:fontRef>
+        </p:style>
+      </p:cxnSp>
+      <p:sp>
+        <p:nvSpPr>
+          <p:cNvPr id="130" name="TextBox 129"/>
+          <p:cNvSpPr txBox="1"/>
+          <p:nvPr/>
+        </p:nvSpPr>
+        <p:spPr>
+          <a:xfrm flipH="1">
+            <a:off x="6247187" y="4915241"/>
+            <a:ext cx="846605" cy="307777"/>
+          </a:xfrm>
+          <a:prstGeom prst="rect">
+            <a:avLst/>
+          </a:prstGeom>
+          <a:noFill/>
+        </p:spPr>
+        <p:txBody>
+          <a:bodyPr wrap="square" rtlCol="0">
+            <a:spAutoFit/>
+          </a:bodyPr>
+          <a:lstStyle/>
+          <a:p>
+            <a:r>
+              <a:rPr lang="en-US" sz="1400" dirty="0" smtClean="0">
+                <a:solidFill>
+                  <a:schemeClr val="accent2">
+                    <a:lumMod val="75000"/>
+                  </a:schemeClr>
+                </a:solidFill>
+              </a:rPr>
+              <a:t>Serial</a:t>
+            </a:r>
+            <a:endParaRPr lang="en-US" sz="1400" dirty="0">
+              <a:solidFill>
+                <a:schemeClr val="accent2">
+                  <a:lumMod val="75000"/>
+                </a:schemeClr>
+              </a:solidFill>
+            </a:endParaRPr>
+          </a:p>
+        </p:txBody>
+      </p:sp>
+      <p:sp>
+        <p:nvSpPr>
+          <p:cNvPr id="132" name="TextBox 131"/>
+          <p:cNvSpPr txBox="1"/>
+          <p:nvPr/>
+        </p:nvSpPr>
+        <p:spPr>
+          <a:xfrm flipH="1">
+            <a:off x="7810151" y="4909836"/>
+            <a:ext cx="846605" cy="307777"/>
+          </a:xfrm>
+          <a:prstGeom prst="rect">
+            <a:avLst/>
+          </a:prstGeom>
+          <a:noFill/>
+        </p:spPr>
+        <p:txBody>
+          <a:bodyPr wrap="square" rtlCol="0">
+            <a:spAutoFit/>
+          </a:bodyPr>
+          <a:lstStyle/>
+          <a:p>
+            <a:r>
+              <a:rPr lang="en-US" sz="1400" dirty="0" smtClean="0">
+                <a:solidFill>
+                  <a:schemeClr val="accent2">
+                    <a:lumMod val="75000"/>
+                  </a:schemeClr>
+                </a:solidFill>
+              </a:rPr>
+              <a:t>Serial</a:t>
+            </a:r>
+            <a:endParaRPr lang="en-US" sz="1400" dirty="0">
+              <a:solidFill>
+                <a:schemeClr val="accent2">
+                  <a:lumMod val="75000"/>
+                </a:schemeClr>
+              </a:solidFill>
+            </a:endParaRPr>
           </a:p>
         </p:txBody>
       </p:sp>
@@ -6026,7 +6764,7 @@
   <a:extraClrSchemeLst/>
   <a:extLst>
     <a:ext uri="{05A4C25C-085E-4340-85A3-A5531E510DB2}">
-      <thm15:themeFamily xmlns:thm15="http://schemas.microsoft.com/office/thememl/2012/main" name="Office Theme" id="{62F939B6-93AF-4DB8-9C6B-D6C7DFDC589F}" vid="{4A3C46E8-61CC-4603-A589-7422A47A8E4A}"/>
+      <thm15:themeFamily xmlns:thm15="http://schemas.microsoft.com/office/thememl/2012/main" xmlns="" name="Office Theme" id="{62F939B6-93AF-4DB8-9C6B-D6C7DFDC589F}" vid="{4A3C46E8-61CC-4603-A589-7422A47A8E4A}"/>
     </a:ext>
   </a:extLst>
 </a:theme>

</xml_diff>